<commit_message>
Add some new Files to the Project. Also some changings in the structure
</commit_message>
<xml_diff>
--- a/documents/projectmanagment/Definition/Phasenplan  Meilensteine.pptx
+++ b/documents/projectmanagment/Definition/Phasenplan  Meilensteine.pptx
@@ -2506,6 +2506,114 @@
         </a:p>
       </dgm:t>
     </dgm:pt>
+    <dgm:pt modelId="{62AB1178-884F-4D39-B0B4-466A2DA286D8}">
+      <dgm:prSet phldrT="[Text]" custT="1"/>
+      <dgm:spPr/>
+      <dgm:t>
+        <a:bodyPr/>
+        <a:lstStyle/>
+        <a:p>
+          <a:r>
+            <a:rPr lang="de-DE" sz="1000" dirty="0"/>
+            <a:t>Design</a:t>
+          </a:r>
+        </a:p>
+      </dgm:t>
+    </dgm:pt>
+    <dgm:pt modelId="{4BF29E6F-DBF5-43C7-8029-8D6EE0458462}" type="parTrans" cxnId="{53FC6827-380F-4D2A-BD57-A2010899D243}">
+      <dgm:prSet/>
+      <dgm:spPr/>
+      <dgm:t>
+        <a:bodyPr/>
+        <a:lstStyle/>
+        <a:p>
+          <a:endParaRPr lang="de-DE"/>
+        </a:p>
+      </dgm:t>
+    </dgm:pt>
+    <dgm:pt modelId="{017CE2E8-CADA-4F30-BA5E-046D7F17DA55}" type="sibTrans" cxnId="{53FC6827-380F-4D2A-BD57-A2010899D243}">
+      <dgm:prSet/>
+      <dgm:spPr/>
+      <dgm:t>
+        <a:bodyPr/>
+        <a:lstStyle/>
+        <a:p>
+          <a:endParaRPr lang="de-DE"/>
+        </a:p>
+      </dgm:t>
+    </dgm:pt>
+    <dgm:pt modelId="{94678B53-AD11-40D7-8379-9BB95BC57C09}">
+      <dgm:prSet phldrT="[Text]" custT="1"/>
+      <dgm:spPr/>
+      <dgm:t>
+        <a:bodyPr/>
+        <a:lstStyle/>
+        <a:p>
+          <a:r>
+            <a:rPr lang="de-DE" sz="1000" dirty="0"/>
+            <a:t>Datenhaltung</a:t>
+          </a:r>
+        </a:p>
+      </dgm:t>
+    </dgm:pt>
+    <dgm:pt modelId="{AE65816D-D540-4240-801F-E3B2AF2A8833}" type="parTrans" cxnId="{7B9CC01A-4598-4E1B-9805-3B0E8BA361AF}">
+      <dgm:prSet/>
+      <dgm:spPr/>
+      <dgm:t>
+        <a:bodyPr/>
+        <a:lstStyle/>
+        <a:p>
+          <a:endParaRPr lang="de-DE"/>
+        </a:p>
+      </dgm:t>
+    </dgm:pt>
+    <dgm:pt modelId="{F6770E39-D2ED-427D-9929-984C46A1C07D}" type="sibTrans" cxnId="{7B9CC01A-4598-4E1B-9805-3B0E8BA361AF}">
+      <dgm:prSet/>
+      <dgm:spPr/>
+      <dgm:t>
+        <a:bodyPr/>
+        <a:lstStyle/>
+        <a:p>
+          <a:endParaRPr lang="de-DE"/>
+        </a:p>
+      </dgm:t>
+    </dgm:pt>
+    <dgm:pt modelId="{319FD50C-304E-4C27-9A73-FCE74DBAEC9D}">
+      <dgm:prSet phldrT="[Text]" custT="1"/>
+      <dgm:spPr/>
+      <dgm:t>
+        <a:bodyPr/>
+        <a:lstStyle/>
+        <a:p>
+          <a:r>
+            <a:rPr lang="de-DE" sz="1000" dirty="0"/>
+            <a:t>Funktionen</a:t>
+          </a:r>
+        </a:p>
+      </dgm:t>
+    </dgm:pt>
+    <dgm:pt modelId="{E85950C8-ED49-4385-880D-086A86F48042}" type="parTrans" cxnId="{ACFA52C9-C12C-4588-A5BC-FEAC808D6AE0}">
+      <dgm:prSet/>
+      <dgm:spPr/>
+      <dgm:t>
+        <a:bodyPr/>
+        <a:lstStyle/>
+        <a:p>
+          <a:endParaRPr lang="de-DE"/>
+        </a:p>
+      </dgm:t>
+    </dgm:pt>
+    <dgm:pt modelId="{16BA5334-16F3-411C-9A22-65494D89E2F7}" type="sibTrans" cxnId="{ACFA52C9-C12C-4588-A5BC-FEAC808D6AE0}">
+      <dgm:prSet/>
+      <dgm:spPr/>
+      <dgm:t>
+        <a:bodyPr/>
+        <a:lstStyle/>
+        <a:p>
+          <a:endParaRPr lang="de-DE"/>
+        </a:p>
+      </dgm:t>
+    </dgm:pt>
     <dgm:pt modelId="{34878B87-FAC4-43C1-AD57-472EE13DFBAD}" type="pres">
       <dgm:prSet presAssocID="{74C2428C-51A9-4567-A0FE-F0A39B939EDB}" presName="Name0" presStyleCnt="0">
         <dgm:presLayoutVars>
@@ -2776,9 +2884,11 @@
     <dgm:cxn modelId="{1F3AC41A-B900-4225-A78E-DA159BA47274}" srcId="{4FC9A8CD-3C38-457D-AE19-7124F557D0D3}" destId="{67CD7419-3426-4601-B26C-4284AA48FB60}" srcOrd="0" destOrd="0" parTransId="{555D7510-7303-4BA5-9F0B-D78235905BB0}" sibTransId="{7A9EE7F0-2C85-4884-B530-CD52C8C8C3E5}"/>
     <dgm:cxn modelId="{D85A825B-F7E8-430D-8E7C-09DE635F4B2C}" type="presOf" srcId="{A22CC1BF-2C68-4BA1-A418-0E0F5B99E7A5}" destId="{F290BE4F-F408-4AE5-AE1C-0A7FC5F54F77}" srcOrd="0" destOrd="2" presId="urn:microsoft.com/office/officeart/2009/3/layout/RandomtoResultProcess"/>
     <dgm:cxn modelId="{90179F41-80C9-4C38-B027-B38A644425A1}" type="presOf" srcId="{C4863FFF-0E85-4D7F-9995-E43F8AF96910}" destId="{F290BE4F-F408-4AE5-AE1C-0A7FC5F54F77}" srcOrd="0" destOrd="6" presId="urn:microsoft.com/office/officeart/2009/3/layout/RandomtoResultProcess"/>
+    <dgm:cxn modelId="{7B9CC01A-4598-4E1B-9805-3B0E8BA361AF}" srcId="{0747F730-FA46-413A-A0F4-9C3544E22A7B}" destId="{94678B53-AD11-40D7-8379-9BB95BC57C09}" srcOrd="1" destOrd="0" parTransId="{AE65816D-D540-4240-801F-E3B2AF2A8833}" sibTransId="{F6770E39-D2ED-427D-9929-984C46A1C07D}"/>
     <dgm:cxn modelId="{7B28C5BF-96F7-4151-B3AD-28407D2C5602}" srcId="{039196E0-81FD-463D-984E-321204BBB3AE}" destId="{298AC369-EF12-4A65-939E-154C4988E42B}" srcOrd="1" destOrd="0" parTransId="{B491F5CF-8D1B-4DE7-9833-A7F3DB69AD56}" sibTransId="{A5A409DB-D81D-417D-B55B-9DE30980ACCE}"/>
     <dgm:cxn modelId="{6BE94D7D-CC88-44BF-8B2E-D04EC53D2ACC}" type="presOf" srcId="{DFA50CB2-25BD-401A-A791-9E21C321B770}" destId="{F290BE4F-F408-4AE5-AE1C-0A7FC5F54F77}" srcOrd="0" destOrd="1" presId="urn:microsoft.com/office/officeart/2009/3/layout/RandomtoResultProcess"/>
-    <dgm:cxn modelId="{2F3A1586-3DBC-4844-B9AB-E6C7F8AB309E}" type="presOf" srcId="{7370189A-B5F7-47E4-B8D7-7F69637B4FDC}" destId="{154F8263-26FE-4585-8BFF-69B1327770B3}" srcOrd="0" destOrd="3" presId="urn:microsoft.com/office/officeart/2009/3/layout/RandomtoResultProcess"/>
+    <dgm:cxn modelId="{2F3A1586-3DBC-4844-B9AB-E6C7F8AB309E}" type="presOf" srcId="{7370189A-B5F7-47E4-B8D7-7F69637B4FDC}" destId="{154F8263-26FE-4585-8BFF-69B1327770B3}" srcOrd="0" destOrd="6" presId="urn:microsoft.com/office/officeart/2009/3/layout/RandomtoResultProcess"/>
+    <dgm:cxn modelId="{ACFA52C9-C12C-4588-A5BC-FEAC808D6AE0}" srcId="{0747F730-FA46-413A-A0F4-9C3544E22A7B}" destId="{319FD50C-304E-4C27-9A73-FCE74DBAEC9D}" srcOrd="2" destOrd="0" parTransId="{E85950C8-ED49-4385-880D-086A86F48042}" sibTransId="{16BA5334-16F3-411C-9A22-65494D89E2F7}"/>
     <dgm:cxn modelId="{CAA136F9-CA2F-4FF8-B4B6-57D962C5A8CD}" srcId="{01DE3B65-B352-4A0B-A786-4E70E1E180EE}" destId="{0747F730-FA46-413A-A0F4-9C3544E22A7B}" srcOrd="0" destOrd="0" parTransId="{4DAED85C-50EF-4FC9-8C75-FB678724FBCC}" sibTransId="{1C335635-A106-4A34-9FC5-53E819C1F5E2}"/>
     <dgm:cxn modelId="{FCFD8E32-7254-4B39-9112-F840F3E38F88}" type="presOf" srcId="{8873AC7D-AFB4-4834-A8CD-9EB7E2C6ECA8}" destId="{9AF02610-F7D4-4C9A-AA9E-662F3BB986E8}" srcOrd="0" destOrd="5" presId="urn:microsoft.com/office/officeart/2009/3/layout/RandomtoResultProcess"/>
     <dgm:cxn modelId="{7EA08A2D-7A4A-4471-AA2A-B1B72B66233F}" srcId="{4FC9A8CD-3C38-457D-AE19-7124F557D0D3}" destId="{118ED1D9-E78B-4FF7-9D45-7818C63297BB}" srcOrd="3" destOrd="0" parTransId="{F8A71BFC-3CA9-4925-895F-160A2EC8C2D4}" sibTransId="{CC09AC27-BACC-4717-AB87-03CD20A63E7C}"/>
@@ -2803,7 +2913,7 @@
     <dgm:cxn modelId="{24851C49-5D70-4451-9CD5-1D66FBDBBA90}" srcId="{EB089353-ED2D-49E4-A7C3-D66C7DCA5127}" destId="{A1094463-E08C-402D-B159-67F8BBE42EE3}" srcOrd="0" destOrd="0" parTransId="{47B626EB-DF18-4BDC-9BE6-D6094733834E}" sibTransId="{A7DC8FDB-BB86-4DF3-90EA-7535735CC966}"/>
     <dgm:cxn modelId="{4C617166-AE08-47F1-9CDF-66EEA90D531A}" srcId="{D2934413-210E-4992-B8DA-F62D5FDA9DA3}" destId="{E191D642-AAB7-44F8-B86E-DDB5E7054560}" srcOrd="4" destOrd="0" parTransId="{A5405C7F-7D2B-4FB1-9E01-E10DE0353291}" sibTransId="{DCD3F525-6C9D-443C-BD7B-1B6810363AE8}"/>
     <dgm:cxn modelId="{C6A8907A-EA03-481B-B764-F232D630F84A}" type="presOf" srcId="{E191D642-AAB7-44F8-B86E-DDB5E7054560}" destId="{F290BE4F-F408-4AE5-AE1C-0A7FC5F54F77}" srcOrd="0" destOrd="4" presId="urn:microsoft.com/office/officeart/2009/3/layout/RandomtoResultProcess"/>
-    <dgm:cxn modelId="{4E7A1BB4-A46F-4844-8279-BE9CCA11E4B8}" type="presOf" srcId="{9A3CA7BA-5F37-48E2-BAB3-FFDCBC9AC0B4}" destId="{154F8263-26FE-4585-8BFF-69B1327770B3}" srcOrd="0" destOrd="2" presId="urn:microsoft.com/office/officeart/2009/3/layout/RandomtoResultProcess"/>
+    <dgm:cxn modelId="{4E7A1BB4-A46F-4844-8279-BE9CCA11E4B8}" type="presOf" srcId="{9A3CA7BA-5F37-48E2-BAB3-FFDCBC9AC0B4}" destId="{154F8263-26FE-4585-8BFF-69B1327770B3}" srcOrd="0" destOrd="5" presId="urn:microsoft.com/office/officeart/2009/3/layout/RandomtoResultProcess"/>
     <dgm:cxn modelId="{AC9AA3F9-0360-44D2-AAB0-BEAF5D6D1EE4}" type="presOf" srcId="{16924922-919C-4300-B4A8-EA36C8BB0ABC}" destId="{C0E3D6A3-A197-4CA0-B6CE-F7063A79F091}" srcOrd="0" destOrd="6" presId="urn:microsoft.com/office/officeart/2009/3/layout/RandomtoResultProcess"/>
     <dgm:cxn modelId="{39CBB839-1633-4EE9-B622-A7D1F140BC55}" srcId="{74C2428C-51A9-4567-A0FE-F0A39B939EDB}" destId="{D2934413-210E-4992-B8DA-F62D5FDA9DA3}" srcOrd="0" destOrd="0" parTransId="{8B26F2AD-DEFB-457C-A794-E605514B66D7}" sibTransId="{32EB8EBC-098E-425B-9928-311BEF2267FD}"/>
     <dgm:cxn modelId="{61E9DFC7-8C92-4CC0-87E7-FB30A98F96A0}" srcId="{74C2428C-51A9-4567-A0FE-F0A39B939EDB}" destId="{78414D6D-86CF-4BB0-A443-C650852B29DB}" srcOrd="5" destOrd="0" parTransId="{F379FB0B-002C-419C-B7F7-8C6B785543A2}" sibTransId="{423CA998-4906-4DD4-B853-704A55E3D2C2}"/>
@@ -2833,18 +2943,20 @@
     <dgm:cxn modelId="{4FF0B08A-4165-41FE-B4CB-5132E47CECEF}" srcId="{A1094463-E08C-402D-B159-67F8BBE42EE3}" destId="{C6132068-4C85-4EDC-B109-27FF20EAC735}" srcOrd="0" destOrd="0" parTransId="{20A09180-D4C7-4D77-966C-D485989B6E3E}" sibTransId="{28B4D302-3E9B-4FEF-81B4-B089E421B1A8}"/>
     <dgm:cxn modelId="{F1A19222-C8F3-42CD-8A83-3BD65013F66C}" type="presOf" srcId="{74C2428C-51A9-4567-A0FE-F0A39B939EDB}" destId="{34878B87-FAC4-43C1-AD57-472EE13DFBAD}" srcOrd="0" destOrd="0" presId="urn:microsoft.com/office/officeart/2009/3/layout/RandomtoResultProcess"/>
     <dgm:cxn modelId="{3D9E9AF0-D152-4273-9744-4E42D6B095E1}" srcId="{D2934413-210E-4992-B8DA-F62D5FDA9DA3}" destId="{E673CF80-9AFA-4B96-B73A-CAEB57FC0122}" srcOrd="9" destOrd="0" parTransId="{12C6D27F-89F5-4A92-BAC5-8480CC03FB5B}" sibTransId="{6B8664B5-D4E3-4B57-BAD3-0C22DE4AA193}"/>
+    <dgm:cxn modelId="{B9412BA9-998D-44A2-8D81-E789A867117B}" type="presOf" srcId="{319FD50C-304E-4C27-9A73-FCE74DBAEC9D}" destId="{154F8263-26FE-4585-8BFF-69B1327770B3}" srcOrd="0" destOrd="3" presId="urn:microsoft.com/office/officeart/2009/3/layout/RandomtoResultProcess"/>
     <dgm:cxn modelId="{673A262D-370C-46EC-ABA2-DD797EE714DB}" type="presOf" srcId="{C6132068-4C85-4EDC-B109-27FF20EAC735}" destId="{5D740803-5F66-4677-9B2D-D519476ECE53}" srcOrd="0" destOrd="1" presId="urn:microsoft.com/office/officeart/2009/3/layout/RandomtoResultProcess"/>
     <dgm:cxn modelId="{0D86A185-D6D5-4CAC-B02A-ECA794F5837F}" type="presOf" srcId="{25F107E0-C9BB-4961-8013-33E8205E5634}" destId="{F290BE4F-F408-4AE5-AE1C-0A7FC5F54F77}" srcOrd="0" destOrd="7" presId="urn:microsoft.com/office/officeart/2009/3/layout/RandomtoResultProcess"/>
     <dgm:cxn modelId="{14F37F3D-85B8-4AAB-8FFC-D51CB01C989B}" srcId="{78414D6D-86CF-4BB0-A443-C650852B29DB}" destId="{C885E718-C477-4CD1-B7F3-F56573ABEAAD}" srcOrd="3" destOrd="0" parTransId="{9215D0B3-863D-4233-913D-291C1B8A3418}" sibTransId="{CAFD3BD4-8CAC-42DE-952E-29EEF89FA440}"/>
     <dgm:cxn modelId="{CCEA8464-EEB2-43D0-BC52-DFBB7CA5A214}" srcId="{4FC9A8CD-3C38-457D-AE19-7124F557D0D3}" destId="{8873AC7D-AFB4-4834-A8CD-9EB7E2C6ECA8}" srcOrd="5" destOrd="0" parTransId="{A741DBD4-6C31-44AF-A99A-68E721D46347}" sibTransId="{A6F5821F-84C4-44F1-AE27-486A88AE6C07}"/>
     <dgm:cxn modelId="{35FA898B-049C-4392-A309-86F677DCD1ED}" srcId="{E6C42C34-E6BC-4B4F-B68B-366B9D3B91FB}" destId="{7A8B431E-833A-4EDF-8D76-1C602AD4CA85}" srcOrd="2" destOrd="0" parTransId="{2CBF9808-426B-4EB6-884D-AA71BDA3500E}" sibTransId="{C1919A99-7304-4AC6-9390-4099AE581405}"/>
+    <dgm:cxn modelId="{53FC6827-380F-4D2A-BD57-A2010899D243}" srcId="{0747F730-FA46-413A-A0F4-9C3544E22A7B}" destId="{62AB1178-884F-4D39-B0B4-466A2DA286D8}" srcOrd="0" destOrd="0" parTransId="{4BF29E6F-DBF5-43C7-8029-8D6EE0458462}" sibTransId="{017CE2E8-CADA-4F30-BA5E-046D7F17DA55}"/>
     <dgm:cxn modelId="{F431647B-3C03-4009-9C40-7EA9A4D5B275}" type="presOf" srcId="{298AC369-EF12-4A65-939E-154C4988E42B}" destId="{C0E3D6A3-A197-4CA0-B6CE-F7063A79F091}" srcOrd="0" destOrd="2" presId="urn:microsoft.com/office/officeart/2009/3/layout/RandomtoResultProcess"/>
     <dgm:cxn modelId="{534242F9-98BC-4E52-9C9D-702E994F9125}" type="presOf" srcId="{D01B0157-3E3F-441E-ACB9-1E675B2EF353}" destId="{F290BE4F-F408-4AE5-AE1C-0A7FC5F54F77}" srcOrd="0" destOrd="0" presId="urn:microsoft.com/office/officeart/2009/3/layout/RandomtoResultProcess"/>
     <dgm:cxn modelId="{164FD28D-F34F-486B-AA7F-88E4CD24600A}" srcId="{74C2428C-51A9-4567-A0FE-F0A39B939EDB}" destId="{01DE3B65-B352-4A0B-A786-4E70E1E180EE}" srcOrd="1" destOrd="0" parTransId="{4D8A4C30-30D1-4B36-AC8D-76AD06DB3AFE}" sibTransId="{1757637C-3B62-4D67-A97A-9341BC011203}"/>
     <dgm:cxn modelId="{F817B09A-A761-4159-A47D-4381DD843706}" srcId="{74C2428C-51A9-4567-A0FE-F0A39B939EDB}" destId="{0C23CFEE-FF4E-4E97-B648-67DDB6C84A17}" srcOrd="3" destOrd="0" parTransId="{C4262E2B-7A18-417F-A823-2CF752AC5CE7}" sibTransId="{3E620DB1-12DD-4A2C-9043-C37123BD9F96}"/>
     <dgm:cxn modelId="{53CC397F-CE73-4D07-A704-BD77B23B5AA0}" type="presOf" srcId="{FD629D47-E81D-4957-A354-0AD5D4865BDA}" destId="{9AF02610-F7D4-4C9A-AA9E-662F3BB986E8}" srcOrd="0" destOrd="4" presId="urn:microsoft.com/office/officeart/2009/3/layout/RandomtoResultProcess"/>
     <dgm:cxn modelId="{A97A0B9E-58C6-42C6-982B-385783B98E79}" type="presOf" srcId="{7A8B431E-833A-4EDF-8D76-1C602AD4CA85}" destId="{C0E3D6A3-A197-4CA0-B6CE-F7063A79F091}" srcOrd="0" destOrd="7" presId="urn:microsoft.com/office/officeart/2009/3/layout/RandomtoResultProcess"/>
-    <dgm:cxn modelId="{EED346BA-F0AE-4F53-B3FC-B9E227E5B97D}" type="presOf" srcId="{17D2D238-2764-43EB-98C3-852D92A13E89}" destId="{154F8263-26FE-4585-8BFF-69B1327770B3}" srcOrd="0" destOrd="1" presId="urn:microsoft.com/office/officeart/2009/3/layout/RandomtoResultProcess"/>
+    <dgm:cxn modelId="{EED346BA-F0AE-4F53-B3FC-B9E227E5B97D}" type="presOf" srcId="{17D2D238-2764-43EB-98C3-852D92A13E89}" destId="{154F8263-26FE-4585-8BFF-69B1327770B3}" srcOrd="0" destOrd="4" presId="urn:microsoft.com/office/officeart/2009/3/layout/RandomtoResultProcess"/>
     <dgm:cxn modelId="{BEAD4E79-28F5-4930-A19F-6D73CA3926F2}" type="presOf" srcId="{AF6CA02E-483E-4E0D-B1AA-F5298690A1C9}" destId="{F800704F-4F07-4479-9E01-C1E49B8F2B47}" srcOrd="0" destOrd="2" presId="urn:microsoft.com/office/officeart/2009/3/layout/RandomtoResultProcess"/>
     <dgm:cxn modelId="{D44B6551-E687-49D3-BE02-9AE661D4B1E7}" type="presOf" srcId="{4FC9A8CD-3C38-457D-AE19-7124F557D0D3}" destId="{33F180D4-B60F-44ED-8ADE-5246B6B40418}" srcOrd="0" destOrd="0" presId="urn:microsoft.com/office/officeart/2009/3/layout/RandomtoResultProcess"/>
     <dgm:cxn modelId="{DB106EF2-2079-4292-8CE1-91AE05C9D2A7}" type="presOf" srcId="{DBBCB365-AB53-4195-9E0A-430843EE1CB3}" destId="{F290BE4F-F408-4AE5-AE1C-0A7FC5F54F77}" srcOrd="0" destOrd="5" presId="urn:microsoft.com/office/officeart/2009/3/layout/RandomtoResultProcess"/>
@@ -2854,8 +2966,10 @@
     <dgm:cxn modelId="{E87E7BEA-8FE3-4575-8DD3-60DAB2D306BD}" srcId="{0C23CFEE-FF4E-4E97-B648-67DDB6C84A17}" destId="{E6C42C34-E6BC-4B4F-B68B-366B9D3B91FB}" srcOrd="1" destOrd="0" parTransId="{6A809923-42A5-4D56-A953-929829164880}" sibTransId="{5AF9758D-90CB-4831-AFA5-412A3861793A}"/>
     <dgm:cxn modelId="{E3D1E159-83A1-48C8-AEBF-8E2954D0A39C}" type="presOf" srcId="{4B728711-7E61-467C-81AB-BEE67E835687}" destId="{F290BE4F-F408-4AE5-AE1C-0A7FC5F54F77}" srcOrd="0" destOrd="8" presId="urn:microsoft.com/office/officeart/2009/3/layout/RandomtoResultProcess"/>
     <dgm:cxn modelId="{AB721CE3-E7A3-484A-8A9C-4DD7FA6F3006}" srcId="{D2934413-210E-4992-B8DA-F62D5FDA9DA3}" destId="{C4863FFF-0E85-4D7F-9995-E43F8AF96910}" srcOrd="6" destOrd="0" parTransId="{EBA4B5CB-A788-42AC-9F32-9603DDE28CC9}" sibTransId="{4DEBEBAB-68B5-4FA1-9058-6D5BB8F8DD49}"/>
+    <dgm:cxn modelId="{813398A6-F6C3-43E8-9EF0-9B0F9EA20F74}" type="presOf" srcId="{62AB1178-884F-4D39-B0B4-466A2DA286D8}" destId="{154F8263-26FE-4585-8BFF-69B1327770B3}" srcOrd="0" destOrd="1" presId="urn:microsoft.com/office/officeart/2009/3/layout/RandomtoResultProcess"/>
     <dgm:cxn modelId="{6B980057-FD89-4AE6-ADCB-EB0C2AD3C3F5}" srcId="{74C2428C-51A9-4567-A0FE-F0A39B939EDB}" destId="{4FC9A8CD-3C38-457D-AE19-7124F557D0D3}" srcOrd="2" destOrd="0" parTransId="{FE6911BB-0FAC-4D87-9BBC-CE4172BBE933}" sibTransId="{6893E97F-F750-42E3-A5DE-DF80F4560205}"/>
     <dgm:cxn modelId="{24321373-8CDE-468A-A7F2-F0996F78BBD4}" type="presOf" srcId="{039196E0-81FD-463D-984E-321204BBB3AE}" destId="{C0E3D6A3-A197-4CA0-B6CE-F7063A79F091}" srcOrd="0" destOrd="0" presId="urn:microsoft.com/office/officeart/2009/3/layout/RandomtoResultProcess"/>
+    <dgm:cxn modelId="{788A7728-D35C-4195-90EC-F626AFDEB738}" type="presOf" srcId="{94678B53-AD11-40D7-8379-9BB95BC57C09}" destId="{154F8263-26FE-4585-8BFF-69B1327770B3}" srcOrd="0" destOrd="2" presId="urn:microsoft.com/office/officeart/2009/3/layout/RandomtoResultProcess"/>
     <dgm:cxn modelId="{0E419B70-AF6D-443D-BE68-9CFADD5181C5}" type="presOf" srcId="{EE7A4D86-781C-419D-9829-8205E62E3F00}" destId="{5D740803-5F66-4677-9B2D-D519476ECE53}" srcOrd="0" destOrd="4" presId="urn:microsoft.com/office/officeart/2009/3/layout/RandomtoResultProcess"/>
     <dgm:cxn modelId="{BD300F7C-EC15-4872-B12A-C51E02BE696F}" type="presParOf" srcId="{34878B87-FAC4-43C1-AD57-472EE13DFBAD}" destId="{84B3769B-CDFF-4DF0-9D4A-AB85463D62C4}" srcOrd="0" destOrd="0" presId="urn:microsoft.com/office/officeart/2009/3/layout/RandomtoResultProcess"/>
     <dgm:cxn modelId="{6E5FFF72-C7C8-40C2-8070-55E21D14F555}" type="presParOf" srcId="{84B3769B-CDFF-4DF0-9D4A-AB85463D62C4}" destId="{E028BF05-0E00-41BF-BF7F-FD0DE9361697}" srcOrd="0" destOrd="0" presId="urn:microsoft.com/office/officeart/2009/3/layout/RandomtoResultProcess"/>
@@ -4309,6 +4423,60 @@
           </a:r>
         </a:p>
         <a:p>
+          <a:pPr marL="114300" lvl="2" indent="-57150" algn="l" defTabSz="444500">
+            <a:lnSpc>
+              <a:spcPct val="90000"/>
+            </a:lnSpc>
+            <a:spcBef>
+              <a:spcPct val="0"/>
+            </a:spcBef>
+            <a:spcAft>
+              <a:spcPct val="15000"/>
+            </a:spcAft>
+            <a:buChar char="•"/>
+          </a:pPr>
+          <a:r>
+            <a:rPr lang="de-DE" sz="1000" kern="1200" dirty="0"/>
+            <a:t>Design</a:t>
+          </a:r>
+        </a:p>
+        <a:p>
+          <a:pPr marL="114300" lvl="2" indent="-57150" algn="l" defTabSz="444500">
+            <a:lnSpc>
+              <a:spcPct val="90000"/>
+            </a:lnSpc>
+            <a:spcBef>
+              <a:spcPct val="0"/>
+            </a:spcBef>
+            <a:spcAft>
+              <a:spcPct val="15000"/>
+            </a:spcAft>
+            <a:buChar char="•"/>
+          </a:pPr>
+          <a:r>
+            <a:rPr lang="de-DE" sz="1000" kern="1200" dirty="0"/>
+            <a:t>Datenhaltung</a:t>
+          </a:r>
+        </a:p>
+        <a:p>
+          <a:pPr marL="114300" lvl="2" indent="-57150" algn="l" defTabSz="444500">
+            <a:lnSpc>
+              <a:spcPct val="90000"/>
+            </a:lnSpc>
+            <a:spcBef>
+              <a:spcPct val="0"/>
+            </a:spcBef>
+            <a:spcAft>
+              <a:spcPct val="15000"/>
+            </a:spcAft>
+            <a:buChar char="•"/>
+          </a:pPr>
+          <a:r>
+            <a:rPr lang="de-DE" sz="1000" kern="1200" dirty="0"/>
+            <a:t>Funktionen</a:t>
+          </a:r>
+        </a:p>
+        <a:p>
           <a:pPr marL="57150" lvl="1" indent="-57150" algn="l" defTabSz="444500">
             <a:lnSpc>
               <a:spcPct val="90000"/>
@@ -7224,7 +7392,7 @@
           <a:p>
             <a:fld id="{1232905B-3A82-4437-A4D7-3F9BC7901AF3}" type="datetimeFigureOut">
               <a:rPr lang="de-DE" smtClean="0"/>
-              <a:t>13.07.2016</a:t>
+              <a:t>15.07.2016</a:t>
             </a:fld>
             <a:endParaRPr lang="de-DE"/>
           </a:p>
@@ -7392,7 +7560,7 @@
           <a:p>
             <a:fld id="{1232905B-3A82-4437-A4D7-3F9BC7901AF3}" type="datetimeFigureOut">
               <a:rPr lang="de-DE" smtClean="0"/>
-              <a:t>13.07.2016</a:t>
+              <a:t>15.07.2016</a:t>
             </a:fld>
             <a:endParaRPr lang="de-DE"/>
           </a:p>
@@ -7570,7 +7738,7 @@
           <a:p>
             <a:fld id="{1232905B-3A82-4437-A4D7-3F9BC7901AF3}" type="datetimeFigureOut">
               <a:rPr lang="de-DE" smtClean="0"/>
-              <a:t>13.07.2016</a:t>
+              <a:t>15.07.2016</a:t>
             </a:fld>
             <a:endParaRPr lang="de-DE"/>
           </a:p>
@@ -7738,7 +7906,7 @@
           <a:p>
             <a:fld id="{1232905B-3A82-4437-A4D7-3F9BC7901AF3}" type="datetimeFigureOut">
               <a:rPr lang="de-DE" smtClean="0"/>
-              <a:t>13.07.2016</a:t>
+              <a:t>15.07.2016</a:t>
             </a:fld>
             <a:endParaRPr lang="de-DE"/>
           </a:p>
@@ -7983,7 +8151,7 @@
           <a:p>
             <a:fld id="{1232905B-3A82-4437-A4D7-3F9BC7901AF3}" type="datetimeFigureOut">
               <a:rPr lang="de-DE" smtClean="0"/>
-              <a:t>13.07.2016</a:t>
+              <a:t>15.07.2016</a:t>
             </a:fld>
             <a:endParaRPr lang="de-DE"/>
           </a:p>
@@ -8212,7 +8380,7 @@
           <a:p>
             <a:fld id="{1232905B-3A82-4437-A4D7-3F9BC7901AF3}" type="datetimeFigureOut">
               <a:rPr lang="de-DE" smtClean="0"/>
-              <a:t>13.07.2016</a:t>
+              <a:t>15.07.2016</a:t>
             </a:fld>
             <a:endParaRPr lang="de-DE"/>
           </a:p>
@@ -8576,7 +8744,7 @@
           <a:p>
             <a:fld id="{1232905B-3A82-4437-A4D7-3F9BC7901AF3}" type="datetimeFigureOut">
               <a:rPr lang="de-DE" smtClean="0"/>
-              <a:t>13.07.2016</a:t>
+              <a:t>15.07.2016</a:t>
             </a:fld>
             <a:endParaRPr lang="de-DE"/>
           </a:p>
@@ -8693,7 +8861,7 @@
           <a:p>
             <a:fld id="{1232905B-3A82-4437-A4D7-3F9BC7901AF3}" type="datetimeFigureOut">
               <a:rPr lang="de-DE" smtClean="0"/>
-              <a:t>13.07.2016</a:t>
+              <a:t>15.07.2016</a:t>
             </a:fld>
             <a:endParaRPr lang="de-DE"/>
           </a:p>
@@ -8788,7 +8956,7 @@
           <a:p>
             <a:fld id="{1232905B-3A82-4437-A4D7-3F9BC7901AF3}" type="datetimeFigureOut">
               <a:rPr lang="de-DE" smtClean="0"/>
-              <a:t>13.07.2016</a:t>
+              <a:t>15.07.2016</a:t>
             </a:fld>
             <a:endParaRPr lang="de-DE"/>
           </a:p>
@@ -9063,7 +9231,7 @@
           <a:p>
             <a:fld id="{1232905B-3A82-4437-A4D7-3F9BC7901AF3}" type="datetimeFigureOut">
               <a:rPr lang="de-DE" smtClean="0"/>
-              <a:t>13.07.2016</a:t>
+              <a:t>15.07.2016</a:t>
             </a:fld>
             <a:endParaRPr lang="de-DE"/>
           </a:p>
@@ -9315,7 +9483,7 @@
           <a:p>
             <a:fld id="{1232905B-3A82-4437-A4D7-3F9BC7901AF3}" type="datetimeFigureOut">
               <a:rPr lang="de-DE" smtClean="0"/>
-              <a:t>13.07.2016</a:t>
+              <a:t>15.07.2016</a:t>
             </a:fld>
             <a:endParaRPr lang="de-DE"/>
           </a:p>
@@ -9526,7 +9694,7 @@
           <a:p>
             <a:fld id="{1232905B-3A82-4437-A4D7-3F9BC7901AF3}" type="datetimeFigureOut">
               <a:rPr lang="de-DE" smtClean="0"/>
-              <a:t>13.07.2016</a:t>
+              <a:t>15.07.2016</a:t>
             </a:fld>
             <a:endParaRPr lang="de-DE"/>
           </a:p>
@@ -9975,13 +10143,13 @@
             <p:ph idx="1"/>
             <p:extLst>
               <p:ext uri="{D42A27DB-BD31-4B8C-83A1-F6EECF244321}">
-                <p14:modId xmlns:p14="http://schemas.microsoft.com/office/powerpoint/2010/main" val="1172901092"/>
+                <p14:modId xmlns:p14="http://schemas.microsoft.com/office/powerpoint/2010/main" val="1526343828"/>
               </p:ext>
             </p:extLst>
           </p:nvPr>
         </p:nvGraphicFramePr>
         <p:xfrm>
-          <a:off x="615778" y="1690688"/>
+          <a:off x="640492" y="1690688"/>
           <a:ext cx="10960443" cy="4621427"/>
         </p:xfrm>
         <a:graphic>

</xml_diff>